<commit_message>
Update pptx, removed outdated presentation_content, corrected lambda.sh
</commit_message>
<xml_diff>
--- a/Presentation.pptx
+++ b/Presentation.pptx
@@ -242,7 +242,7 @@
           <a:p>
             <a:fld id="{3FDC14FC-A894-4869-A797-1EC82735D106}" type="datetimeFigureOut">
               <a:rPr lang="en-US" smtClean="0"/>
-              <a:t>11/16/2019</a:t>
+              <a:t>11/18/2019</a:t>
             </a:fld>
             <a:endParaRPr lang="en-US"/>
           </a:p>
@@ -407,7 +407,7 @@
           <a:p>
             <a:fld id="{B4F99C05-63F9-4248-8E20-3ACD9DF9DE7F}" type="datetimeFigureOut">
               <a:rPr lang="en-US" smtClean="0"/>
-              <a:t>11/16/2019</a:t>
+              <a:t>11/18/2019</a:t>
             </a:fld>
             <a:endParaRPr lang="en-US"/>
           </a:p>
@@ -9534,7 +9534,7 @@
           </a:ln>
           <a:extLst>
             <a:ext uri="{C572A759-6A51-4108-AA02-DFA0A04FC94B}">
-              <ma14:wrappingTextBoxFlag xmlns="" xmlns:ma14="http://schemas.microsoft.com/office/mac/drawingml/2011/main" val="1"/>
+              <ma14:wrappingTextBoxFlag xmlns:ma14="http://schemas.microsoft.com/office/mac/drawingml/2011/main" xmlns="" val="1"/>
             </a:ext>
           </a:extLst>
         </p:spPr>
@@ -37727,6 +37727,13 @@
           </a:p>
           <a:p>
             <a:r>
+              <a:rPr lang="pl-PL"/>
+              <a:t>Create custom resources via CloudFormation</a:t>
+            </a:r>
+            <a:endParaRPr lang="pl-PL" dirty="0"/>
+          </a:p>
+          <a:p>
+            <a:r>
               <a:rPr lang="pl-PL" dirty="0"/>
               <a:t>Dynamically change Auto Scaling Group size on numerous factors</a:t>
             </a:r>
@@ -39071,6 +39078,121 @@
                                           <p:spTgt spid="3">
                                             <p:txEl>
                                               <p:pRg st="10" end="10"/>
+                                            </p:txEl>
+                                          </p:spTgt>
+                                        </p:tgtEl>
+                                        <p:attrNameLst>
+                                          <p:attrName>ppt_y</p:attrName>
+                                        </p:attrNameLst>
+                                      </p:cBhvr>
+                                      <p:tavLst>
+                                        <p:tav tm="0">
+                                          <p:val>
+                                            <p:strVal val="#ppt_y+.1"/>
+                                          </p:val>
+                                        </p:tav>
+                                        <p:tav tm="100000">
+                                          <p:val>
+                                            <p:strVal val="#ppt_y"/>
+                                          </p:val>
+                                        </p:tav>
+                                      </p:tavLst>
+                                    </p:anim>
+                                  </p:childTnLst>
+                                </p:cTn>
+                              </p:par>
+                            </p:childTnLst>
+                          </p:cTn>
+                        </p:par>
+                      </p:childTnLst>
+                    </p:cTn>
+                  </p:par>
+                  <p:par>
+                    <p:cTn id="80" fill="hold">
+                      <p:stCondLst>
+                        <p:cond delay="indefinite"/>
+                      </p:stCondLst>
+                      <p:childTnLst>
+                        <p:par>
+                          <p:cTn id="81" fill="hold">
+                            <p:stCondLst>
+                              <p:cond delay="0"/>
+                            </p:stCondLst>
+                            <p:childTnLst>
+                              <p:par>
+                                <p:cTn id="82" presetID="42" presetClass="entr" presetSubtype="0" fill="hold" grpId="0" nodeType="clickEffect">
+                                  <p:stCondLst>
+                                    <p:cond delay="0"/>
+                                  </p:stCondLst>
+                                  <p:childTnLst>
+                                    <p:set>
+                                      <p:cBhvr>
+                                        <p:cTn id="83" dur="1" fill="hold">
+                                          <p:stCondLst>
+                                            <p:cond delay="0"/>
+                                          </p:stCondLst>
+                                        </p:cTn>
+                                        <p:tgtEl>
+                                          <p:spTgt spid="3">
+                                            <p:txEl>
+                                              <p:pRg st="11" end="11"/>
+                                            </p:txEl>
+                                          </p:spTgt>
+                                        </p:tgtEl>
+                                        <p:attrNameLst>
+                                          <p:attrName>style.visibility</p:attrName>
+                                        </p:attrNameLst>
+                                      </p:cBhvr>
+                                      <p:to>
+                                        <p:strVal val="visible"/>
+                                      </p:to>
+                                    </p:set>
+                                    <p:animEffect transition="in" filter="fade">
+                                      <p:cBhvr>
+                                        <p:cTn id="84" dur="1000"/>
+                                        <p:tgtEl>
+                                          <p:spTgt spid="3">
+                                            <p:txEl>
+                                              <p:pRg st="11" end="11"/>
+                                            </p:txEl>
+                                          </p:spTgt>
+                                        </p:tgtEl>
+                                      </p:cBhvr>
+                                    </p:animEffect>
+                                    <p:anim calcmode="lin" valueType="num">
+                                      <p:cBhvr>
+                                        <p:cTn id="85" dur="1000" fill="hold"/>
+                                        <p:tgtEl>
+                                          <p:spTgt spid="3">
+                                            <p:txEl>
+                                              <p:pRg st="11" end="11"/>
+                                            </p:txEl>
+                                          </p:spTgt>
+                                        </p:tgtEl>
+                                        <p:attrNameLst>
+                                          <p:attrName>ppt_x</p:attrName>
+                                        </p:attrNameLst>
+                                      </p:cBhvr>
+                                      <p:tavLst>
+                                        <p:tav tm="0">
+                                          <p:val>
+                                            <p:strVal val="#ppt_x"/>
+                                          </p:val>
+                                        </p:tav>
+                                        <p:tav tm="100000">
+                                          <p:val>
+                                            <p:strVal val="#ppt_x"/>
+                                          </p:val>
+                                        </p:tav>
+                                      </p:tavLst>
+                                    </p:anim>
+                                    <p:anim calcmode="lin" valueType="num">
+                                      <p:cBhvr>
+                                        <p:cTn id="86" dur="1000" fill="hold"/>
+                                        <p:tgtEl>
+                                          <p:spTgt spid="3">
+                                            <p:txEl>
+                                              <p:pRg st="11" end="11"/>
                                             </p:txEl>
                                           </p:spTgt>
                                         </p:tgtEl>

</xml_diff>